<commit_message>
made zoomed in version, working on changing cutoff for ENCODE sim_mats and adding web-site buttons
</commit_message>
<xml_diff>
--- a/img/sim_mat_images/similarity_matrices_slide.pptx
+++ b/img/sim_mat_images/similarity_matrices_slide.pptx
@@ -5,10 +5,11 @@
     <p:sldMasterId id="2147483648" r:id="rId1"/>
   </p:sldMasterIdLst>
   <p:notesMasterIdLst>
-    <p:notesMasterId r:id="rId3"/>
+    <p:notesMasterId r:id="rId4"/>
   </p:notesMasterIdLst>
   <p:sldIdLst>
     <p:sldId id="257" r:id="rId2"/>
+    <p:sldId id="258" r:id="rId3"/>
   </p:sldIdLst>
   <p:sldSz cx="12192000" cy="6858000"/>
   <p:notesSz cx="6858000" cy="9144000"/>
@@ -512,6 +513,67 @@
     <p:extLst>
       <p:ext uri="{BB962C8B-B14F-4D97-AF65-F5344CB8AC3E}">
         <p14:creationId xmlns:p14="http://schemas.microsoft.com/office/powerpoint/2010/main" val="308873527"/>
+      </p:ext>
+    </p:extLst>
+  </p:cSld>
+  <p:clrMapOvr>
+    <a:masterClrMapping/>
+  </p:clrMapOvr>
+</p:notes>
+</file>
+
+<file path=ppt/notesSlides/notesSlide2.xml><?xml version="1.0" encoding="utf-8"?>
+<p:notes xmlns:a="http://schemas.openxmlformats.org/drawingml/2006/main" xmlns:r="http://schemas.openxmlformats.org/officeDocument/2006/relationships" xmlns:p="http://schemas.openxmlformats.org/presentationml/2006/main">
+  <p:cSld>
+    <p:spTree>
+      <p:nvGrpSpPr>
+        <p:cNvPr id="1" name=""/>
+        <p:cNvGrpSpPr/>
+        <p:nvPr/>
+      </p:nvGrpSpPr>
+      <p:grpSpPr>
+        <a:xfrm>
+          <a:off x="0" y="0"/>
+          <a:ext cx="0" cy="0"/>
+          <a:chOff x="0" y="0"/>
+          <a:chExt cx="0" cy="0"/>
+        </a:xfrm>
+      </p:grpSpPr>
+      <p:sp>
+        <p:nvSpPr>
+          <p:cNvPr id="2" name="Slide Image Placeholder 1"/>
+          <p:cNvSpPr>
+            <a:spLocks noGrp="1" noRot="1" noChangeAspect="1"/>
+          </p:cNvSpPr>
+          <p:nvPr>
+            <p:ph type="sldImg"/>
+          </p:nvPr>
+        </p:nvSpPr>
+        <p:spPr/>
+      </p:sp>
+      <p:sp>
+        <p:nvSpPr>
+          <p:cNvPr id="3" name="Notes Placeholder 2"/>
+          <p:cNvSpPr>
+            <a:spLocks noGrp="1"/>
+          </p:cNvSpPr>
+          <p:nvPr>
+            <p:ph type="body" idx="1"/>
+          </p:nvPr>
+        </p:nvSpPr>
+        <p:spPr/>
+        <p:txBody>
+          <a:bodyPr/>
+          <a:lstStyle/>
+          <a:p>
+            <a:endParaRPr lang="en-US" dirty="0"/>
+          </a:p>
+        </p:txBody>
+      </p:sp>
+    </p:spTree>
+    <p:extLst>
+      <p:ext uri="{BB962C8B-B14F-4D97-AF65-F5344CB8AC3E}">
+        <p14:creationId xmlns:p14="http://schemas.microsoft.com/office/powerpoint/2010/main" val="217048995"/>
       </p:ext>
     </p:extLst>
   </p:cSld>
@@ -4178,6 +4240,297 @@
     <p:extLst>
       <p:ext uri="{BB962C8B-B14F-4D97-AF65-F5344CB8AC3E}">
         <p14:creationId xmlns:p14="http://schemas.microsoft.com/office/powerpoint/2010/main" val="626490224"/>
+      </p:ext>
+    </p:extLst>
+  </p:cSld>
+  <p:clrMapOvr>
+    <a:masterClrMapping/>
+  </p:clrMapOvr>
+  <p:timing>
+    <p:tnLst>
+      <p:par>
+        <p:cTn id="1" dur="indefinite" restart="never" nodeType="tmRoot"/>
+      </p:par>
+    </p:tnLst>
+  </p:timing>
+</p:sld>
+</file>
+
+<file path=ppt/slides/slide2.xml><?xml version="1.0" encoding="utf-8"?>
+<p:sld xmlns:a="http://schemas.openxmlformats.org/drawingml/2006/main" xmlns:r="http://schemas.openxmlformats.org/officeDocument/2006/relationships" xmlns:p="http://schemas.openxmlformats.org/presentationml/2006/main">
+  <p:cSld>
+    <p:spTree>
+      <p:nvGrpSpPr>
+        <p:cNvPr id="1" name=""/>
+        <p:cNvGrpSpPr/>
+        <p:nvPr/>
+      </p:nvGrpSpPr>
+      <p:grpSpPr>
+        <a:xfrm>
+          <a:off x="0" y="0"/>
+          <a:ext cx="0" cy="0"/>
+          <a:chOff x="0" y="0"/>
+          <a:chExt cx="0" cy="0"/>
+        </a:xfrm>
+      </p:grpSpPr>
+      <p:pic>
+        <p:nvPicPr>
+          <p:cNvPr id="34" name="Picture 33"/>
+          <p:cNvPicPr>
+            <a:picLocks noChangeAspect="1"/>
+          </p:cNvPicPr>
+          <p:nvPr/>
+        </p:nvPicPr>
+        <p:blipFill>
+          <a:blip r:embed="rId3">
+            <a:extLst>
+              <a:ext uri="{28A0092B-C50C-407E-A947-70E740481C1C}">
+                <a14:useLocalDpi xmlns:a14="http://schemas.microsoft.com/office/drawing/2010/main" val="0"/>
+              </a:ext>
+            </a:extLst>
+          </a:blip>
+          <a:stretch>
+            <a:fillRect/>
+          </a:stretch>
+        </p:blipFill>
+        <p:spPr>
+          <a:xfrm>
+            <a:off x="6773077" y="1681733"/>
+            <a:ext cx="5275422" cy="4781697"/>
+          </a:xfrm>
+          <a:prstGeom prst="rect">
+            <a:avLst/>
+          </a:prstGeom>
+        </p:spPr>
+      </p:pic>
+      <p:sp>
+        <p:nvSpPr>
+          <p:cNvPr id="2" name="Title 1"/>
+          <p:cNvSpPr>
+            <a:spLocks noGrp="1"/>
+          </p:cNvSpPr>
+          <p:nvPr>
+            <p:ph type="title"/>
+          </p:nvPr>
+        </p:nvSpPr>
+        <p:spPr>
+          <a:xfrm>
+            <a:off x="525623" y="310515"/>
+            <a:ext cx="10832733" cy="676693"/>
+          </a:xfrm>
+        </p:spPr>
+        <p:txBody>
+          <a:bodyPr>
+            <a:normAutofit fontScale="90000"/>
+          </a:bodyPr>
+          <a:lstStyle/>
+          <a:p>
+            <a:r>
+              <a:rPr lang="en-US" dirty="0" smtClean="0"/>
+              <a:t>Kinase Similarit</a:t>
+            </a:r>
+            <a:r>
+              <a:rPr lang="en-US" dirty="0" smtClean="0"/>
+              <a:t>y based on CCLE Gene Expression</a:t>
+            </a:r>
+            <a:endParaRPr lang="en-US" dirty="0"/>
+          </a:p>
+        </p:txBody>
+      </p:sp>
+      <p:pic>
+        <p:nvPicPr>
+          <p:cNvPr id="3" name="Picture 2"/>
+          <p:cNvPicPr>
+            <a:picLocks noChangeAspect="1"/>
+          </p:cNvPicPr>
+          <p:nvPr/>
+        </p:nvPicPr>
+        <p:blipFill>
+          <a:blip r:embed="rId4">
+            <a:extLst>
+              <a:ext uri="{28A0092B-C50C-407E-A947-70E740481C1C}">
+                <a14:useLocalDpi xmlns:a14="http://schemas.microsoft.com/office/drawing/2010/main" val="0"/>
+              </a:ext>
+            </a:extLst>
+          </a:blip>
+          <a:stretch>
+            <a:fillRect/>
+          </a:stretch>
+        </p:blipFill>
+        <p:spPr>
+          <a:xfrm>
+            <a:off x="620037" y="1446570"/>
+            <a:ext cx="5114361" cy="5151421"/>
+          </a:xfrm>
+          <a:prstGeom prst="rect">
+            <a:avLst/>
+          </a:prstGeom>
+        </p:spPr>
+      </p:pic>
+      <p:cxnSp>
+        <p:nvCxnSpPr>
+          <p:cNvPr id="25" name="Straight Connector 24"/>
+          <p:cNvCxnSpPr/>
+          <p:nvPr/>
+        </p:nvCxnSpPr>
+        <p:spPr>
+          <a:xfrm flipV="1">
+            <a:off x="4121063" y="2073058"/>
+            <a:ext cx="2887249" cy="3175347"/>
+          </a:xfrm>
+          <a:prstGeom prst="line">
+            <a:avLst/>
+          </a:prstGeom>
+          <a:ln w="38100"/>
+        </p:spPr>
+        <p:style>
+          <a:lnRef idx="1">
+            <a:schemeClr val="accent1"/>
+          </a:lnRef>
+          <a:fillRef idx="0">
+            <a:schemeClr val="accent1"/>
+          </a:fillRef>
+          <a:effectRef idx="0">
+            <a:schemeClr val="accent1"/>
+          </a:effectRef>
+          <a:fontRef idx="minor">
+            <a:schemeClr val="tx1"/>
+          </a:fontRef>
+        </p:style>
+      </p:cxnSp>
+      <p:cxnSp>
+        <p:nvCxnSpPr>
+          <p:cNvPr id="28" name="Straight Connector 27"/>
+          <p:cNvCxnSpPr/>
+          <p:nvPr/>
+        </p:nvCxnSpPr>
+        <p:spPr>
+          <a:xfrm>
+            <a:off x="4296427" y="5530240"/>
+            <a:ext cx="2793305" cy="789539"/>
+          </a:xfrm>
+          <a:prstGeom prst="line">
+            <a:avLst/>
+          </a:prstGeom>
+          <a:ln w="38100"/>
+        </p:spPr>
+        <p:style>
+          <a:lnRef idx="1">
+            <a:schemeClr val="accent1"/>
+          </a:lnRef>
+          <a:fillRef idx="0">
+            <a:schemeClr val="accent1"/>
+          </a:fillRef>
+          <a:effectRef idx="0">
+            <a:schemeClr val="accent1"/>
+          </a:effectRef>
+          <a:fontRef idx="minor">
+            <a:schemeClr val="tx1"/>
+          </a:fontRef>
+        </p:style>
+      </p:cxnSp>
+      <p:sp>
+        <p:nvSpPr>
+          <p:cNvPr id="31" name="Title 1"/>
+          <p:cNvSpPr txBox="1">
+            <a:spLocks/>
+          </p:cNvSpPr>
+          <p:nvPr/>
+        </p:nvSpPr>
+        <p:spPr>
+          <a:xfrm>
+            <a:off x="1039661" y="1211881"/>
+            <a:ext cx="3807912" cy="469852"/>
+          </a:xfrm>
+          <a:prstGeom prst="rect">
+            <a:avLst/>
+          </a:prstGeom>
+        </p:spPr>
+        <p:txBody>
+          <a:bodyPr/>
+          <a:lstStyle>
+            <a:lvl1pPr algn="l" defTabSz="1300460" rtl="0" eaLnBrk="1" latinLnBrk="0" hangingPunct="1">
+              <a:lnSpc>
+                <a:spcPct val="90000"/>
+              </a:lnSpc>
+              <a:spcBef>
+                <a:spcPct val="0"/>
+              </a:spcBef>
+              <a:buNone/>
+              <a:defRPr sz="6258" b="1" kern="1200">
+                <a:solidFill>
+                  <a:srgbClr val="175562"/>
+                </a:solidFill>
+                <a:latin typeface="+mj-lt"/>
+                <a:ea typeface="+mj-ea"/>
+                <a:cs typeface="+mj-cs"/>
+              </a:defRPr>
+            </a:lvl1pPr>
+          </a:lstStyle>
+          <a:p>
+            <a:r>
+              <a:rPr lang="en-US" sz="2812" dirty="0" smtClean="0"/>
+              <a:t>All Kinases</a:t>
+            </a:r>
+            <a:endParaRPr lang="en-US" sz="2812" dirty="0"/>
+          </a:p>
+        </p:txBody>
+      </p:sp>
+      <p:sp>
+        <p:nvSpPr>
+          <p:cNvPr id="33" name="Title 1"/>
+          <p:cNvSpPr txBox="1">
+            <a:spLocks/>
+          </p:cNvSpPr>
+          <p:nvPr/>
+        </p:nvSpPr>
+        <p:spPr>
+          <a:xfrm>
+            <a:off x="7505177" y="1211881"/>
+            <a:ext cx="4075134" cy="469852"/>
+          </a:xfrm>
+          <a:prstGeom prst="rect">
+            <a:avLst/>
+          </a:prstGeom>
+        </p:spPr>
+        <p:txBody>
+          <a:bodyPr/>
+          <a:lstStyle>
+            <a:lvl1pPr algn="l" defTabSz="1300460" rtl="0" eaLnBrk="1" latinLnBrk="0" hangingPunct="1">
+              <a:lnSpc>
+                <a:spcPct val="90000"/>
+              </a:lnSpc>
+              <a:spcBef>
+                <a:spcPct val="0"/>
+              </a:spcBef>
+              <a:buNone/>
+              <a:defRPr sz="6258" b="1" kern="1200">
+                <a:solidFill>
+                  <a:srgbClr val="175562"/>
+                </a:solidFill>
+                <a:latin typeface="+mj-lt"/>
+                <a:ea typeface="+mj-ea"/>
+                <a:cs typeface="+mj-cs"/>
+              </a:defRPr>
+            </a:lvl1pPr>
+          </a:lstStyle>
+          <a:p>
+            <a:r>
+              <a:rPr lang="en-US" sz="2812" dirty="0" smtClean="0"/>
+              <a:t>Cell Cycle </a:t>
+            </a:r>
+            <a:r>
+              <a:rPr lang="en-US" sz="2812" smtClean="0"/>
+              <a:t>Related Kinases</a:t>
+            </a:r>
+            <a:endParaRPr lang="en-US" sz="2812" dirty="0"/>
+          </a:p>
+        </p:txBody>
+      </p:sp>
+    </p:spTree>
+    <p:extLst>
+      <p:ext uri="{BB962C8B-B14F-4D97-AF65-F5344CB8AC3E}">
+        <p14:creationId xmlns:p14="http://schemas.microsoft.com/office/powerpoint/2010/main" val="1580183692"/>
       </p:ext>
     </p:extLst>
   </p:cSld>

</xml_diff>

<commit_message>
changed cutoff for encode sim_mats to show more detail
</commit_message>
<xml_diff>
--- a/img/sim_mat_images/similarity_matrices_slide.pptx
+++ b/img/sim_mat_images/similarity_matrices_slide.pptx
@@ -3789,7 +3789,7 @@
         </p:nvSpPr>
         <p:spPr>
           <a:xfrm>
-            <a:off x="7288250" y="1143844"/>
+            <a:off x="7263198" y="1143844"/>
             <a:ext cx="1992967" cy="864727"/>
           </a:xfrm>
           <a:prstGeom prst="rect">
@@ -3968,7 +3968,7 @@
       </p:pic>
       <p:pic>
         <p:nvPicPr>
-          <p:cNvPr id="15" name="Picture 14"/>
+          <p:cNvPr id="16" name="Picture 15"/>
           <p:cNvPicPr>
             <a:picLocks noChangeAspect="1"/>
           </p:cNvPicPr>
@@ -3988,8 +3988,8 @@
         </p:blipFill>
         <p:spPr>
           <a:xfrm>
-            <a:off x="7590784" y="2042218"/>
-            <a:ext cx="1387898" cy="1414354"/>
+            <a:off x="9899850" y="2042218"/>
+            <a:ext cx="1390038" cy="1414354"/>
           </a:xfrm>
           <a:prstGeom prst="rect">
             <a:avLst/>
@@ -3998,7 +3998,7 @@
       </p:pic>
       <p:pic>
         <p:nvPicPr>
-          <p:cNvPr id="16" name="Picture 15"/>
+          <p:cNvPr id="17" name="Picture 16"/>
           <p:cNvPicPr>
             <a:picLocks noChangeAspect="1"/>
           </p:cNvPicPr>
@@ -4018,8 +4018,8 @@
         </p:blipFill>
         <p:spPr>
           <a:xfrm>
-            <a:off x="9899850" y="2042218"/>
-            <a:ext cx="1390038" cy="1414354"/>
+            <a:off x="2873428" y="3589997"/>
+            <a:ext cx="1404179" cy="1392211"/>
           </a:xfrm>
           <a:prstGeom prst="rect">
             <a:avLst/>
@@ -4028,7 +4028,7 @@
       </p:pic>
       <p:pic>
         <p:nvPicPr>
-          <p:cNvPr id="17" name="Picture 16"/>
+          <p:cNvPr id="19" name="Picture 18"/>
           <p:cNvPicPr>
             <a:picLocks noChangeAspect="1"/>
           </p:cNvPicPr>
@@ -4048,8 +4048,8 @@
         </p:blipFill>
         <p:spPr>
           <a:xfrm>
-            <a:off x="2873428" y="3589997"/>
-            <a:ext cx="1404179" cy="1392211"/>
+            <a:off x="9899334" y="3602356"/>
+            <a:ext cx="1391070" cy="1367493"/>
           </a:xfrm>
           <a:prstGeom prst="rect">
             <a:avLst/>
@@ -4058,7 +4058,7 @@
       </p:pic>
       <p:pic>
         <p:nvPicPr>
-          <p:cNvPr id="18" name="Picture 17"/>
+          <p:cNvPr id="20" name="Picture 19"/>
           <p:cNvPicPr>
             <a:picLocks noChangeAspect="1"/>
           </p:cNvPicPr>
@@ -4078,8 +4078,8 @@
         </p:blipFill>
         <p:spPr>
           <a:xfrm>
-            <a:off x="7596993" y="3607141"/>
-            <a:ext cx="1375481" cy="1357922"/>
+            <a:off x="2873428" y="5133633"/>
+            <a:ext cx="1404179" cy="1424499"/>
           </a:xfrm>
           <a:prstGeom prst="rect">
             <a:avLst/>
@@ -4088,7 +4088,7 @@
       </p:pic>
       <p:pic>
         <p:nvPicPr>
-          <p:cNvPr id="19" name="Picture 18"/>
+          <p:cNvPr id="21" name="Picture 20"/>
           <p:cNvPicPr>
             <a:picLocks noChangeAspect="1"/>
           </p:cNvPicPr>
@@ -4108,8 +4108,8 @@
         </p:blipFill>
         <p:spPr>
           <a:xfrm>
-            <a:off x="9899334" y="3602356"/>
-            <a:ext cx="1391070" cy="1367493"/>
+            <a:off x="5265658" y="5149363"/>
+            <a:ext cx="1370990" cy="1393038"/>
           </a:xfrm>
           <a:prstGeom prst="rect">
             <a:avLst/>
@@ -4118,7 +4118,7 @@
       </p:pic>
       <p:pic>
         <p:nvPicPr>
-          <p:cNvPr id="20" name="Picture 19"/>
+          <p:cNvPr id="23" name="Picture 22"/>
           <p:cNvPicPr>
             <a:picLocks noChangeAspect="1"/>
           </p:cNvPicPr>
@@ -4138,8 +4138,8 @@
         </p:blipFill>
         <p:spPr>
           <a:xfrm>
-            <a:off x="2873428" y="5133633"/>
-            <a:ext cx="1404179" cy="1424499"/>
+            <a:off x="9899850" y="5137615"/>
+            <a:ext cx="1390038" cy="1416534"/>
           </a:xfrm>
           <a:prstGeom prst="rect">
             <a:avLst/>
@@ -4148,7 +4148,7 @@
       </p:pic>
       <p:pic>
         <p:nvPicPr>
-          <p:cNvPr id="21" name="Picture 20"/>
+          <p:cNvPr id="24" name="Picture 23"/>
           <p:cNvPicPr>
             <a:picLocks noChangeAspect="1"/>
           </p:cNvPicPr>
@@ -4168,8 +4168,8 @@
         </p:blipFill>
         <p:spPr>
           <a:xfrm>
-            <a:off x="5265658" y="5149363"/>
-            <a:ext cx="1370990" cy="1393038"/>
+            <a:off x="7554140" y="2008571"/>
+            <a:ext cx="1411082" cy="1448001"/>
           </a:xfrm>
           <a:prstGeom prst="rect">
             <a:avLst/>
@@ -4178,7 +4178,7 @@
       </p:pic>
       <p:pic>
         <p:nvPicPr>
-          <p:cNvPr id="22" name="Picture 21"/>
+          <p:cNvPr id="27" name="Picture 26"/>
           <p:cNvPicPr>
             <a:picLocks noChangeAspect="1"/>
           </p:cNvPicPr>
@@ -4198,8 +4198,8 @@
         </p:blipFill>
         <p:spPr>
           <a:xfrm>
-            <a:off x="7596993" y="5146058"/>
-            <a:ext cx="1375481" cy="1399648"/>
+            <a:off x="7559097" y="3578562"/>
+            <a:ext cx="1401169" cy="1391287"/>
           </a:xfrm>
           <a:prstGeom prst="rect">
             <a:avLst/>
@@ -4208,7 +4208,7 @@
       </p:pic>
       <p:pic>
         <p:nvPicPr>
-          <p:cNvPr id="23" name="Picture 22"/>
+          <p:cNvPr id="28" name="Picture 27"/>
           <p:cNvPicPr>
             <a:picLocks noChangeAspect="1"/>
           </p:cNvPicPr>
@@ -4228,8 +4228,8 @@
         </p:blipFill>
         <p:spPr>
           <a:xfrm>
-            <a:off x="9899850" y="5137615"/>
-            <a:ext cx="1390038" cy="1416534"/>
+            <a:off x="7565349" y="5117031"/>
+            <a:ext cx="1388665" cy="1425370"/>
           </a:xfrm>
           <a:prstGeom prst="rect">
             <a:avLst/>

</xml_diff>